<commit_message>
Added link to application sample.
</commit_message>
<xml_diff>
--- a/TypeScript for the .NET Developer/CRINETA 20150406/TypeScript for the .NET Developer.pptx
+++ b/TypeScript for the .NET Developer/CRINETA 20150406/TypeScript for the .NET Developer.pptx
@@ -5,7 +5,7 @@
     <p:sldMasterId id="2147483660" r:id="rId1"/>
   </p:sldMasterIdLst>
   <p:notesMasterIdLst>
-    <p:notesMasterId r:id="rId12"/>
+    <p:notesMasterId r:id="rId13"/>
   </p:notesMasterIdLst>
   <p:sldIdLst>
     <p:sldId id="256" r:id="rId2"/>
@@ -17,7 +17,8 @@
     <p:sldId id="272" r:id="rId8"/>
     <p:sldId id="273" r:id="rId9"/>
     <p:sldId id="276" r:id="rId10"/>
-    <p:sldId id="269" r:id="rId11"/>
+    <p:sldId id="277" r:id="rId11"/>
+    <p:sldId id="269" r:id="rId12"/>
   </p:sldIdLst>
   <p:sldSz cx="12192000" cy="6858000"/>
   <p:notesSz cx="6858000" cy="9144000"/>
@@ -130,6 +131,7 @@
             <p14:sldId id="272"/>
             <p14:sldId id="273"/>
             <p14:sldId id="276"/>
+            <p14:sldId id="277"/>
             <p14:sldId id="269"/>
           </p14:sldIdLst>
         </p14:section>
@@ -224,7 +226,7 @@
           <a:p>
             <a:fld id="{808EA803-7C92-4DF7-88C2-171098DA16C3}" type="datetimeFigureOut">
               <a:rPr lang="en-US" smtClean="0"/>
-              <a:t>4/5/2015</a:t>
+              <a:t>4/6/2015</a:t>
             </a:fld>
             <a:endParaRPr lang="en-US"/>
           </a:p>
@@ -707,7 +709,7 @@
           <a:p>
             <a:fld id="{856365B8-A905-4126-A305-28D558C34FD5}" type="datetimeFigureOut">
               <a:rPr lang="en-US" smtClean="0"/>
-              <a:t>4/5/2015</a:t>
+              <a:t>4/6/2015</a:t>
             </a:fld>
             <a:endParaRPr lang="en-US"/>
           </a:p>
@@ -877,7 +879,7 @@
           <a:p>
             <a:fld id="{856365B8-A905-4126-A305-28D558C34FD5}" type="datetimeFigureOut">
               <a:rPr lang="en-US" smtClean="0"/>
-              <a:t>4/5/2015</a:t>
+              <a:t>4/6/2015</a:t>
             </a:fld>
             <a:endParaRPr lang="en-US"/>
           </a:p>
@@ -1057,7 +1059,7 @@
           <a:p>
             <a:fld id="{856365B8-A905-4126-A305-28D558C34FD5}" type="datetimeFigureOut">
               <a:rPr lang="en-US" smtClean="0"/>
-              <a:t>4/5/2015</a:t>
+              <a:t>4/6/2015</a:t>
             </a:fld>
             <a:endParaRPr lang="en-US"/>
           </a:p>
@@ -1227,7 +1229,7 @@
           <a:p>
             <a:fld id="{856365B8-A905-4126-A305-28D558C34FD5}" type="datetimeFigureOut">
               <a:rPr lang="en-US" smtClean="0"/>
-              <a:t>4/5/2015</a:t>
+              <a:t>4/6/2015</a:t>
             </a:fld>
             <a:endParaRPr lang="en-US"/>
           </a:p>
@@ -1473,7 +1475,7 @@
           <a:p>
             <a:fld id="{856365B8-A905-4126-A305-28D558C34FD5}" type="datetimeFigureOut">
               <a:rPr lang="en-US" smtClean="0"/>
-              <a:t>4/5/2015</a:t>
+              <a:t>4/6/2015</a:t>
             </a:fld>
             <a:endParaRPr lang="en-US"/>
           </a:p>
@@ -1705,7 +1707,7 @@
           <a:p>
             <a:fld id="{856365B8-A905-4126-A305-28D558C34FD5}" type="datetimeFigureOut">
               <a:rPr lang="en-US" smtClean="0"/>
-              <a:t>4/5/2015</a:t>
+              <a:t>4/6/2015</a:t>
             </a:fld>
             <a:endParaRPr lang="en-US"/>
           </a:p>
@@ -2072,7 +2074,7 @@
           <a:p>
             <a:fld id="{856365B8-A905-4126-A305-28D558C34FD5}" type="datetimeFigureOut">
               <a:rPr lang="en-US" smtClean="0"/>
-              <a:t>4/5/2015</a:t>
+              <a:t>4/6/2015</a:t>
             </a:fld>
             <a:endParaRPr lang="en-US"/>
           </a:p>
@@ -2190,7 +2192,7 @@
           <a:p>
             <a:fld id="{856365B8-A905-4126-A305-28D558C34FD5}" type="datetimeFigureOut">
               <a:rPr lang="en-US" smtClean="0"/>
-              <a:t>4/5/2015</a:t>
+              <a:t>4/6/2015</a:t>
             </a:fld>
             <a:endParaRPr lang="en-US"/>
           </a:p>
@@ -2285,7 +2287,7 @@
           <a:p>
             <a:fld id="{856365B8-A905-4126-A305-28D558C34FD5}" type="datetimeFigureOut">
               <a:rPr lang="en-US" smtClean="0"/>
-              <a:t>4/5/2015</a:t>
+              <a:t>4/6/2015</a:t>
             </a:fld>
             <a:endParaRPr lang="en-US"/>
           </a:p>
@@ -2562,7 +2564,7 @@
           <a:p>
             <a:fld id="{856365B8-A905-4126-A305-28D558C34FD5}" type="datetimeFigureOut">
               <a:rPr lang="en-US" smtClean="0"/>
-              <a:t>4/5/2015</a:t>
+              <a:t>4/6/2015</a:t>
             </a:fld>
             <a:endParaRPr lang="en-US"/>
           </a:p>
@@ -2819,7 +2821,7 @@
           <a:p>
             <a:fld id="{856365B8-A905-4126-A305-28D558C34FD5}" type="datetimeFigureOut">
               <a:rPr lang="en-US" smtClean="0"/>
-              <a:t>4/5/2015</a:t>
+              <a:t>4/6/2015</a:t>
             </a:fld>
             <a:endParaRPr lang="en-US"/>
           </a:p>
@@ -3032,7 +3034,7 @@
           <a:p>
             <a:fld id="{856365B8-A905-4126-A305-28D558C34FD5}" type="datetimeFigureOut">
               <a:rPr lang="en-US" smtClean="0"/>
-              <a:t>4/5/2015</a:t>
+              <a:t>4/6/2015</a:t>
             </a:fld>
             <a:endParaRPr lang="en-US"/>
           </a:p>
@@ -3590,6 +3592,131 @@
 </file>
 
 <file path=ppt/slides/slide10.xml><?xml version="1.0" encoding="utf-8"?>
+<p:sld xmlns:a="http://schemas.openxmlformats.org/drawingml/2006/main" xmlns:r="http://schemas.openxmlformats.org/officeDocument/2006/relationships" xmlns:p="http://schemas.openxmlformats.org/presentationml/2006/main">
+  <p:cSld>
+    <p:spTree>
+      <p:nvGrpSpPr>
+        <p:cNvPr id="1" name=""/>
+        <p:cNvGrpSpPr/>
+        <p:nvPr/>
+      </p:nvGrpSpPr>
+      <p:grpSpPr>
+        <a:xfrm>
+          <a:off x="0" y="0"/>
+          <a:ext cx="0" cy="0"/>
+          <a:chOff x="0" y="0"/>
+          <a:chExt cx="0" cy="0"/>
+        </a:xfrm>
+      </p:grpSpPr>
+      <p:sp>
+        <p:nvSpPr>
+          <p:cNvPr id="2" name="Title 1"/>
+          <p:cNvSpPr>
+            <a:spLocks noGrp="1"/>
+          </p:cNvSpPr>
+          <p:nvPr>
+            <p:ph type="title"/>
+          </p:nvPr>
+        </p:nvSpPr>
+        <p:spPr/>
+        <p:txBody>
+          <a:bodyPr/>
+          <a:lstStyle/>
+          <a:p>
+            <a:r>
+              <a:rPr lang="en-US" dirty="0" smtClean="0"/>
+              <a:t>Sample Application</a:t>
+            </a:r>
+            <a:endParaRPr lang="en-US" dirty="0"/>
+          </a:p>
+        </p:txBody>
+      </p:sp>
+      <p:sp>
+        <p:nvSpPr>
+          <p:cNvPr id="3" name="Content Placeholder 2"/>
+          <p:cNvSpPr>
+            <a:spLocks noGrp="1"/>
+          </p:cNvSpPr>
+          <p:nvPr>
+            <p:ph idx="1"/>
+          </p:nvPr>
+        </p:nvSpPr>
+        <p:spPr/>
+        <p:txBody>
+          <a:bodyPr/>
+          <a:lstStyle/>
+          <a:p>
+            <a:pPr marL="0" indent="0">
+              <a:buNone/>
+            </a:pPr>
+            <a:r>
+              <a:rPr lang="en-US" dirty="0">
+                <a:hlinkClick r:id="rId2"/>
+              </a:rPr>
+              <a:t>https://</a:t>
+            </a:r>
+            <a:r>
+              <a:rPr lang="en-US" dirty="0" smtClean="0">
+                <a:hlinkClick r:id="rId2"/>
+              </a:rPr>
+              <a:t>github.com/mikecole/CVCreatives</a:t>
+            </a:r>
+            <a:endParaRPr lang="en-US" dirty="0" smtClean="0"/>
+          </a:p>
+          <a:p>
+            <a:pPr marL="0" indent="0">
+              <a:buNone/>
+            </a:pPr>
+            <a:endParaRPr lang="en-US" dirty="0"/>
+          </a:p>
+          <a:p>
+            <a:pPr marL="0" indent="0">
+              <a:buNone/>
+            </a:pPr>
+            <a:r>
+              <a:rPr lang="en-US" dirty="0" smtClean="0"/>
+              <a:t>Branches:</a:t>
+            </a:r>
+          </a:p>
+          <a:p>
+            <a:pPr marL="0" indent="0">
+              <a:buNone/>
+            </a:pPr>
+            <a:r>
+              <a:rPr lang="en-US" dirty="0" smtClean="0"/>
+              <a:t>	Master: Typescript</a:t>
+            </a:r>
+          </a:p>
+          <a:p>
+            <a:pPr marL="0" indent="0">
+              <a:buNone/>
+            </a:pPr>
+            <a:r>
+              <a:rPr lang="en-US" dirty="0" smtClean="0"/>
+              <a:t>	Original: </a:t>
+            </a:r>
+            <a:r>
+              <a:rPr lang="en-US" dirty="0" err="1" smtClean="0"/>
+              <a:t>Javascript</a:t>
+            </a:r>
+            <a:endParaRPr lang="en-US" dirty="0" smtClean="0"/>
+          </a:p>
+        </p:txBody>
+      </p:sp>
+    </p:spTree>
+    <p:extLst>
+      <p:ext uri="{BB962C8B-B14F-4D97-AF65-F5344CB8AC3E}">
+        <p14:creationId xmlns:p14="http://schemas.microsoft.com/office/powerpoint/2010/main" val="1920905511"/>
+      </p:ext>
+    </p:extLst>
+  </p:cSld>
+  <p:clrMapOvr>
+    <a:masterClrMapping/>
+  </p:clrMapOvr>
+</p:sld>
+</file>
+
+<file path=ppt/slides/slide11.xml><?xml version="1.0" encoding="utf-8"?>
 <p:sld xmlns:a="http://schemas.openxmlformats.org/drawingml/2006/main" xmlns:r="http://schemas.openxmlformats.org/officeDocument/2006/relationships" xmlns:p="http://schemas.openxmlformats.org/presentationml/2006/main">
   <p:cSld>
     <p:spTree>
@@ -4261,30 +4388,13 @@
           <a:p>
             <a:r>
               <a:rPr lang="en-US" dirty="0" smtClean="0"/>
-              <a:t>No type </a:t>
-            </a:r>
-            <a:r>
-              <a:rPr lang="en-US" dirty="0" smtClean="0"/>
-              <a:t>safety.</a:t>
-            </a:r>
-            <a:endParaRPr lang="en-US" dirty="0" smtClean="0"/>
-          </a:p>
-          <a:p>
-            <a:r>
-              <a:rPr lang="en-US" dirty="0" smtClean="0"/>
-              <a:t>Functional </a:t>
-            </a:r>
-            <a:r>
-              <a:rPr lang="en-US" dirty="0" smtClean="0"/>
-              <a:t>language with </a:t>
-            </a:r>
-            <a:r>
-              <a:rPr lang="en-US" dirty="0" smtClean="0"/>
-              <a:t>unfriendly </a:t>
-            </a:r>
-            <a:r>
-              <a:rPr lang="en-US" dirty="0" smtClean="0"/>
-              <a:t>syntax.</a:t>
+              <a:t>No type safety.</a:t>
+            </a:r>
+          </a:p>
+          <a:p>
+            <a:r>
+              <a:rPr lang="en-US" dirty="0" smtClean="0"/>
+              <a:t>Functional language with unfriendly syntax.</a:t>
             </a:r>
           </a:p>
           <a:p>

</xml_diff>